<commit_message>
Adds  progress in security design module and reference doc
</commit_message>
<xml_diff>
--- a/cybersecurity-iacs/Rod/Security_Design.pptx
+++ b/cybersecurity-iacs/Rod/Security_Design.pptx
@@ -5,10 +5,10 @@
     <p:sldMasterId id="2147483648" r:id="rId1"/>
   </p:sldMasterIdLst>
   <p:notesMasterIdLst>
-    <p:notesMasterId r:id="rId17"/>
+    <p:notesMasterId r:id="rId22"/>
   </p:notesMasterIdLst>
   <p:handoutMasterIdLst>
-    <p:handoutMasterId r:id="rId18"/>
+    <p:handoutMasterId r:id="rId23"/>
   </p:handoutMasterIdLst>
   <p:sldIdLst>
     <p:sldId id="256" r:id="rId2"/>
@@ -26,6 +26,11 @@
     <p:sldId id="268" r:id="rId14"/>
     <p:sldId id="269" r:id="rId15"/>
     <p:sldId id="270" r:id="rId16"/>
+    <p:sldId id="271" r:id="rId17"/>
+    <p:sldId id="272" r:id="rId18"/>
+    <p:sldId id="273" r:id="rId19"/>
+    <p:sldId id="274" r:id="rId20"/>
+    <p:sldId id="275" r:id="rId21"/>
   </p:sldIdLst>
   <p:sldSz cx="9372600" cy="8297863"/>
   <p:notesSz cx="7315200" cy="9601200"/>
@@ -3390,7 +3395,7 @@
         <p:spPr/>
         <p:txBody>
           <a:bodyPr>
-            <a:normAutofit/>
+            <a:normAutofit lnSpcReduction="10000"/>
           </a:bodyPr>
           <a:lstStyle/>
           <a:p>
@@ -3446,10 +3451,27 @@
           </a:p>
           <a:p>
             <a:r>
-              <a:rPr lang="en-US"/>
+              <a:rPr lang="en-US" dirty="0"/>
               <a:t>Restrict access rights to log files to the minimum required to function</a:t>
             </a:r>
-            <a:endParaRPr lang="en-US" dirty="0"/>
+          </a:p>
+          <a:p>
+            <a:r>
+              <a:rPr lang="en-US" dirty="0"/>
+              <a:t>If logging to a central repository, send log data over a secure channel to avoid eavesdropping or tampering</a:t>
+            </a:r>
+          </a:p>
+          <a:p>
+            <a:r>
+              <a:rPr lang="en-US" dirty="0"/>
+              <a:t>Monitor and analyze logs regularly to extract valuable information and insight</a:t>
+            </a:r>
+          </a:p>
+          <a:p>
+            <a:r>
+              <a:rPr lang="en-US" dirty="0"/>
+              <a:t>Synchronize to an accurate time source for accurate timestamps</a:t>
+            </a:r>
           </a:p>
         </p:txBody>
       </p:sp>
@@ -3521,6 +3543,748 @@
     <p:extLst>
       <p:ext uri="{BB962C8B-B14F-4D97-AF65-F5344CB8AC3E}">
         <p14:creationId xmlns:p14="http://schemas.microsoft.com/office/powerpoint/2010/main" val="979061585"/>
+      </p:ext>
+    </p:extLst>
+  </p:cSld>
+  <p:clrMapOvr>
+    <a:masterClrMapping/>
+  </p:clrMapOvr>
+</p:sld>
+</file>
+
+<file path=ppt/slides/slide16.xml><?xml version="1.0" encoding="utf-8"?>
+<p:sld xmlns:a="http://schemas.openxmlformats.org/drawingml/2006/main" xmlns:r="http://schemas.openxmlformats.org/officeDocument/2006/relationships" xmlns:p="http://schemas.openxmlformats.org/presentationml/2006/main">
+  <p:cSld>
+    <p:spTree>
+      <p:nvGrpSpPr>
+        <p:cNvPr id="1" name=""/>
+        <p:cNvGrpSpPr/>
+        <p:nvPr/>
+      </p:nvGrpSpPr>
+      <p:grpSpPr>
+        <a:xfrm>
+          <a:off x="0" y="0"/>
+          <a:ext cx="0" cy="0"/>
+          <a:chOff x="0" y="0"/>
+          <a:chExt cx="0" cy="0"/>
+        </a:xfrm>
+      </p:grpSpPr>
+      <p:sp>
+        <p:nvSpPr>
+          <p:cNvPr id="2" name="Title 1">
+            <a:extLst>
+              <a:ext uri="{FF2B5EF4-FFF2-40B4-BE49-F238E27FC236}">
+                <a16:creationId xmlns:a16="http://schemas.microsoft.com/office/drawing/2014/main" id="{18E08E82-B2C8-430C-BB0B-68178A7F82D6}"/>
+              </a:ext>
+            </a:extLst>
+          </p:cNvPr>
+          <p:cNvSpPr>
+            <a:spLocks noGrp="1"/>
+          </p:cNvSpPr>
+          <p:nvPr>
+            <p:ph type="title"/>
+          </p:nvPr>
+        </p:nvSpPr>
+        <p:spPr/>
+        <p:txBody>
+          <a:bodyPr/>
+          <a:lstStyle/>
+          <a:p>
+            <a:r>
+              <a:rPr lang="en-CA" dirty="0"/>
+              <a:t>Software Update Policy</a:t>
+            </a:r>
+          </a:p>
+        </p:txBody>
+      </p:sp>
+      <p:sp>
+        <p:nvSpPr>
+          <p:cNvPr id="3" name="Content Placeholder 2">
+            <a:extLst>
+              <a:ext uri="{FF2B5EF4-FFF2-40B4-BE49-F238E27FC236}">
+                <a16:creationId xmlns:a16="http://schemas.microsoft.com/office/drawing/2014/main" id="{C6952363-3F23-47D8-A6CE-FD021C927A06}"/>
+              </a:ext>
+            </a:extLst>
+          </p:cNvPr>
+          <p:cNvSpPr>
+            <a:spLocks noGrp="1"/>
+          </p:cNvSpPr>
+          <p:nvPr>
+            <p:ph idx="1"/>
+          </p:nvPr>
+        </p:nvSpPr>
+        <p:spPr/>
+        <p:txBody>
+          <a:bodyPr/>
+          <a:lstStyle/>
+          <a:p>
+            <a:r>
+              <a:rPr lang="en-US" dirty="0"/>
+              <a:t>Both system builders and users must have a policy about updating software on devices in the field including</a:t>
+            </a:r>
+          </a:p>
+          <a:p>
+            <a:pPr lvl="1"/>
+            <a:r>
+              <a:rPr lang="en-US" dirty="0"/>
+              <a:t>Management of all connected devices over their complete device lifecycle</a:t>
+            </a:r>
+          </a:p>
+          <a:p>
+            <a:pPr lvl="1"/>
+            <a:r>
+              <a:rPr lang="en-US" dirty="0"/>
+              <a:t>A clear, publicized, process for managing software errata</a:t>
+            </a:r>
+          </a:p>
+          <a:p>
+            <a:pPr lvl="1"/>
+            <a:r>
+              <a:rPr lang="en-US" dirty="0"/>
+              <a:t>Clearly defined mechanisms within the software architecture for software updates</a:t>
+            </a:r>
+          </a:p>
+          <a:p>
+            <a:pPr lvl="1"/>
+            <a:r>
+              <a:rPr lang="en-US" dirty="0"/>
+              <a:t>Conformance with standards for software patching</a:t>
+            </a:r>
+          </a:p>
+          <a:p>
+            <a:endParaRPr lang="en-US" dirty="0"/>
+          </a:p>
+          <a:p>
+            <a:pPr lvl="1"/>
+            <a:endParaRPr lang="en-US" dirty="0"/>
+          </a:p>
+          <a:p>
+            <a:endParaRPr lang="en-CA" dirty="0"/>
+          </a:p>
+        </p:txBody>
+      </p:sp>
+      <p:sp>
+        <p:nvSpPr>
+          <p:cNvPr id="4" name="Footer Placeholder 3">
+            <a:extLst>
+              <a:ext uri="{FF2B5EF4-FFF2-40B4-BE49-F238E27FC236}">
+                <a16:creationId xmlns:a16="http://schemas.microsoft.com/office/drawing/2014/main" id="{92D3FC58-5ADE-48B9-9FF4-484A317F8FBA}"/>
+              </a:ext>
+            </a:extLst>
+          </p:cNvPr>
+          <p:cNvSpPr>
+            <a:spLocks noGrp="1"/>
+          </p:cNvSpPr>
+          <p:nvPr>
+            <p:ph type="ftr" sz="quarter" idx="11"/>
+          </p:nvPr>
+        </p:nvSpPr>
+        <p:spPr/>
+        <p:txBody>
+          <a:bodyPr/>
+          <a:lstStyle/>
+          <a:p>
+            <a:pPr algn="l">
+              <a:defRPr/>
+            </a:pPr>
+            <a:r>
+              <a:rPr lang="en-US"/>
+              <a:t>Copyright © 2021 Elephant Scale. All rights reserved.</a:t>
+            </a:r>
+            <a:endParaRPr lang="en-US" dirty="0"/>
+          </a:p>
+        </p:txBody>
+      </p:sp>
+      <p:sp>
+        <p:nvSpPr>
+          <p:cNvPr id="5" name="Slide Number Placeholder 4">
+            <a:extLst>
+              <a:ext uri="{FF2B5EF4-FFF2-40B4-BE49-F238E27FC236}">
+                <a16:creationId xmlns:a16="http://schemas.microsoft.com/office/drawing/2014/main" id="{7AA582B2-7BFC-43A5-B2E0-F553C1119062}"/>
+              </a:ext>
+            </a:extLst>
+          </p:cNvPr>
+          <p:cNvSpPr>
+            <a:spLocks noGrp="1"/>
+          </p:cNvSpPr>
+          <p:nvPr>
+            <p:ph type="sldNum" sz="quarter" idx="12"/>
+          </p:nvPr>
+        </p:nvSpPr>
+        <p:spPr/>
+        <p:txBody>
+          <a:bodyPr/>
+          <a:lstStyle/>
+          <a:p>
+            <a:pPr>
+              <a:defRPr/>
+            </a:pPr>
+            <a:fld id="{77EF9825-4C23-4085-A4E3-B5565466BD91}" type="slidenum">
+              <a:rPr lang="en-US" smtClean="0"/>
+              <a:t>16</a:t>
+            </a:fld>
+            <a:endParaRPr lang="en-US" dirty="0"/>
+          </a:p>
+        </p:txBody>
+      </p:sp>
+    </p:spTree>
+    <p:extLst>
+      <p:ext uri="{BB962C8B-B14F-4D97-AF65-F5344CB8AC3E}">
+        <p14:creationId xmlns:p14="http://schemas.microsoft.com/office/powerpoint/2010/main" val="3428102878"/>
+      </p:ext>
+    </p:extLst>
+  </p:cSld>
+  <p:clrMapOvr>
+    <a:masterClrMapping/>
+  </p:clrMapOvr>
+</p:sld>
+</file>
+
+<file path=ppt/slides/slide17.xml><?xml version="1.0" encoding="utf-8"?>
+<p:sld xmlns:a="http://schemas.openxmlformats.org/drawingml/2006/main" xmlns:r="http://schemas.openxmlformats.org/officeDocument/2006/relationships" xmlns:p="http://schemas.openxmlformats.org/presentationml/2006/main">
+  <p:cSld>
+    <p:spTree>
+      <p:nvGrpSpPr>
+        <p:cNvPr id="1" name=""/>
+        <p:cNvGrpSpPr/>
+        <p:nvPr/>
+      </p:nvGrpSpPr>
+      <p:grpSpPr>
+        <a:xfrm>
+          <a:off x="0" y="0"/>
+          <a:ext cx="0" cy="0"/>
+          <a:chOff x="0" y="0"/>
+          <a:chExt cx="0" cy="0"/>
+        </a:xfrm>
+      </p:grpSpPr>
+      <p:sp>
+        <p:nvSpPr>
+          <p:cNvPr id="2" name="Title 1">
+            <a:extLst>
+              <a:ext uri="{FF2B5EF4-FFF2-40B4-BE49-F238E27FC236}">
+                <a16:creationId xmlns:a16="http://schemas.microsoft.com/office/drawing/2014/main" id="{AE328E50-8E76-43F1-8FE3-2C9AC6E30CE5}"/>
+              </a:ext>
+            </a:extLst>
+          </p:cNvPr>
+          <p:cNvSpPr>
+            <a:spLocks noGrp="1"/>
+          </p:cNvSpPr>
+          <p:nvPr>
+            <p:ph type="title"/>
+          </p:nvPr>
+        </p:nvSpPr>
+        <p:spPr/>
+        <p:txBody>
+          <a:bodyPr/>
+          <a:lstStyle/>
+          <a:p>
+            <a:r>
+              <a:rPr lang="en-CA" dirty="0"/>
+              <a:t>Secure Boot Process</a:t>
+            </a:r>
+          </a:p>
+        </p:txBody>
+      </p:sp>
+      <p:sp>
+        <p:nvSpPr>
+          <p:cNvPr id="3" name="Content Placeholder 2">
+            <a:extLst>
+              <a:ext uri="{FF2B5EF4-FFF2-40B4-BE49-F238E27FC236}">
+                <a16:creationId xmlns:a16="http://schemas.microsoft.com/office/drawing/2014/main" id="{81EC2005-8FE5-4C18-A0AF-256C8EAD0432}"/>
+              </a:ext>
+            </a:extLst>
+          </p:cNvPr>
+          <p:cNvSpPr>
+            <a:spLocks noGrp="1"/>
+          </p:cNvSpPr>
+          <p:nvPr>
+            <p:ph idx="1"/>
+          </p:nvPr>
+        </p:nvSpPr>
+        <p:spPr/>
+        <p:txBody>
+          <a:bodyPr/>
+          <a:lstStyle/>
+          <a:p>
+            <a:r>
+              <a:rPr lang="en-US" dirty="0"/>
+              <a:t>The secure boot cannot be bypassed</a:t>
+            </a:r>
+          </a:p>
+          <a:p>
+            <a:r>
+              <a:rPr lang="en-US" dirty="0"/>
+              <a:t>All code loaded as part of the boot process, unless it runs directly from ROM, is verified to ensure:</a:t>
+            </a:r>
+          </a:p>
+          <a:p>
+            <a:pPr lvl="1"/>
+            <a:r>
+              <a:rPr lang="en-US" dirty="0"/>
+              <a:t>The code was created by the expected, authorized source</a:t>
+            </a:r>
+          </a:p>
+          <a:p>
+            <a:pPr lvl="1"/>
+            <a:r>
+              <a:rPr lang="en-US" dirty="0"/>
+              <a:t>The code has not been modified since it was created</a:t>
+            </a:r>
+          </a:p>
+          <a:p>
+            <a:pPr lvl="1"/>
+            <a:r>
+              <a:rPr lang="en-US" dirty="0"/>
+              <a:t>The code is intended for the device type on which it is to be run</a:t>
+            </a:r>
+          </a:p>
+          <a:p>
+            <a:r>
+              <a:rPr lang="en-US" dirty="0"/>
+              <a:t>Verify code after it has been loaded into RAM as opposed to before when it is in persistent storage</a:t>
+            </a:r>
+          </a:p>
+          <a:p>
+            <a:r>
+              <a:rPr lang="en-US" dirty="0"/>
+              <a:t>The boot sequence starts running from ROM, using an immutable root key to verify the first code to be loaded</a:t>
+            </a:r>
+          </a:p>
+          <a:p>
+            <a:r>
+              <a:rPr lang="en-US" dirty="0"/>
+              <a:t>Modules of code are loaded progressively, but only after each previous stage has been successfully verified and booted</a:t>
+            </a:r>
+          </a:p>
+          <a:p>
+            <a:r>
+              <a:rPr lang="en-US" dirty="0"/>
+              <a:t>Any existing data currently installed on the device that will be used as part of the boot configuration is checked for length, type, range etc. prior to use within the boot process</a:t>
+            </a:r>
+            <a:endParaRPr lang="en-CA" dirty="0"/>
+          </a:p>
+        </p:txBody>
+      </p:sp>
+      <p:sp>
+        <p:nvSpPr>
+          <p:cNvPr id="4" name="Footer Placeholder 3">
+            <a:extLst>
+              <a:ext uri="{FF2B5EF4-FFF2-40B4-BE49-F238E27FC236}">
+                <a16:creationId xmlns:a16="http://schemas.microsoft.com/office/drawing/2014/main" id="{8BAC79DA-54C0-4EC2-9D02-D483DA5915A0}"/>
+              </a:ext>
+            </a:extLst>
+          </p:cNvPr>
+          <p:cNvSpPr>
+            <a:spLocks noGrp="1"/>
+          </p:cNvSpPr>
+          <p:nvPr>
+            <p:ph type="ftr" sz="quarter" idx="11"/>
+          </p:nvPr>
+        </p:nvSpPr>
+        <p:spPr/>
+        <p:txBody>
+          <a:bodyPr/>
+          <a:lstStyle/>
+          <a:p>
+            <a:pPr algn="l">
+              <a:defRPr/>
+            </a:pPr>
+            <a:r>
+              <a:rPr lang="en-US"/>
+              <a:t>Copyright © 2021 Elephant Scale. All rights reserved.</a:t>
+            </a:r>
+            <a:endParaRPr lang="en-US" dirty="0"/>
+          </a:p>
+        </p:txBody>
+      </p:sp>
+      <p:sp>
+        <p:nvSpPr>
+          <p:cNvPr id="5" name="Slide Number Placeholder 4">
+            <a:extLst>
+              <a:ext uri="{FF2B5EF4-FFF2-40B4-BE49-F238E27FC236}">
+                <a16:creationId xmlns:a16="http://schemas.microsoft.com/office/drawing/2014/main" id="{742482B0-F980-4D5D-A4E3-9288BBF5DA91}"/>
+              </a:ext>
+            </a:extLst>
+          </p:cNvPr>
+          <p:cNvSpPr>
+            <a:spLocks noGrp="1"/>
+          </p:cNvSpPr>
+          <p:nvPr>
+            <p:ph type="sldNum" sz="quarter" idx="12"/>
+          </p:nvPr>
+        </p:nvSpPr>
+        <p:spPr/>
+        <p:txBody>
+          <a:bodyPr/>
+          <a:lstStyle/>
+          <a:p>
+            <a:pPr>
+              <a:defRPr/>
+            </a:pPr>
+            <a:fld id="{77EF9825-4C23-4085-A4E3-B5565466BD91}" type="slidenum">
+              <a:rPr lang="en-US" smtClean="0"/>
+              <a:t>17</a:t>
+            </a:fld>
+            <a:endParaRPr lang="en-US" dirty="0"/>
+          </a:p>
+        </p:txBody>
+      </p:sp>
+    </p:spTree>
+    <p:extLst>
+      <p:ext uri="{BB962C8B-B14F-4D97-AF65-F5344CB8AC3E}">
+        <p14:creationId xmlns:p14="http://schemas.microsoft.com/office/powerpoint/2010/main" val="84963411"/>
+      </p:ext>
+    </p:extLst>
+  </p:cSld>
+  <p:clrMapOvr>
+    <a:masterClrMapping/>
+  </p:clrMapOvr>
+</p:sld>
+</file>
+
+<file path=ppt/slides/slide18.xml><?xml version="1.0" encoding="utf-8"?>
+<p:sld xmlns:a="http://schemas.openxmlformats.org/drawingml/2006/main" xmlns:r="http://schemas.openxmlformats.org/officeDocument/2006/relationships" xmlns:p="http://schemas.openxmlformats.org/presentationml/2006/main">
+  <p:cSld>
+    <p:spTree>
+      <p:nvGrpSpPr>
+        <p:cNvPr id="1" name=""/>
+        <p:cNvGrpSpPr/>
+        <p:nvPr/>
+      </p:nvGrpSpPr>
+      <p:grpSpPr>
+        <a:xfrm>
+          <a:off x="0" y="0"/>
+          <a:ext cx="0" cy="0"/>
+          <a:chOff x="0" y="0"/>
+          <a:chExt cx="0" cy="0"/>
+        </a:xfrm>
+      </p:grpSpPr>
+      <p:sp>
+        <p:nvSpPr>
+          <p:cNvPr id="2" name="Title 1">
+            <a:extLst>
+              <a:ext uri="{FF2B5EF4-FFF2-40B4-BE49-F238E27FC236}">
+                <a16:creationId xmlns:a16="http://schemas.microsoft.com/office/drawing/2014/main" id="{AE328E50-8E76-43F1-8FE3-2C9AC6E30CE5}"/>
+              </a:ext>
+            </a:extLst>
+          </p:cNvPr>
+          <p:cNvSpPr>
+            <a:spLocks noGrp="1"/>
+          </p:cNvSpPr>
+          <p:nvPr>
+            <p:ph type="title"/>
+          </p:nvPr>
+        </p:nvSpPr>
+        <p:spPr/>
+        <p:txBody>
+          <a:bodyPr/>
+          <a:lstStyle/>
+          <a:p>
+            <a:r>
+              <a:rPr lang="en-CA" dirty="0"/>
+              <a:t>Secure Boot Process</a:t>
+            </a:r>
+          </a:p>
+        </p:txBody>
+      </p:sp>
+      <p:sp>
+        <p:nvSpPr>
+          <p:cNvPr id="3" name="Content Placeholder 2">
+            <a:extLst>
+              <a:ext uri="{FF2B5EF4-FFF2-40B4-BE49-F238E27FC236}">
+                <a16:creationId xmlns:a16="http://schemas.microsoft.com/office/drawing/2014/main" id="{81EC2005-8FE5-4C18-A0AF-256C8EAD0432}"/>
+              </a:ext>
+            </a:extLst>
+          </p:cNvPr>
+          <p:cNvSpPr>
+            <a:spLocks noGrp="1"/>
+          </p:cNvSpPr>
+          <p:nvPr>
+            <p:ph idx="1"/>
+          </p:nvPr>
+        </p:nvSpPr>
+        <p:spPr/>
+        <p:txBody>
+          <a:bodyPr/>
+          <a:lstStyle/>
+          <a:p>
+            <a:r>
+              <a:rPr lang="en-US" dirty="0"/>
+              <a:t>At each stage of the boot process the boot software checks that the hardware configuration matches the expected configuration parameters for that stage</a:t>
+            </a:r>
+          </a:p>
+          <a:p>
+            <a:r>
+              <a:rPr lang="en-US" dirty="0"/>
+              <a:t>The boot process ensures that if an error occurs during any stage of the process, the device “fails gracefully” into a secure state in which RAM has been cleared of residual code</a:t>
+            </a:r>
+          </a:p>
+          <a:p>
+            <a:pPr lvl="1"/>
+            <a:r>
+              <a:rPr lang="en-US" dirty="0"/>
+              <a:t>Failed boots do not leave the device open to unauthorized access</a:t>
+            </a:r>
+          </a:p>
+          <a:p>
+            <a:r>
+              <a:rPr lang="en-US" dirty="0"/>
+              <a:t>Bootloader code is updated to address vulnerabilities</a:t>
+            </a:r>
+            <a:endParaRPr lang="en-CA" dirty="0"/>
+          </a:p>
+        </p:txBody>
+      </p:sp>
+      <p:sp>
+        <p:nvSpPr>
+          <p:cNvPr id="4" name="Footer Placeholder 3">
+            <a:extLst>
+              <a:ext uri="{FF2B5EF4-FFF2-40B4-BE49-F238E27FC236}">
+                <a16:creationId xmlns:a16="http://schemas.microsoft.com/office/drawing/2014/main" id="{8BAC79DA-54C0-4EC2-9D02-D483DA5915A0}"/>
+              </a:ext>
+            </a:extLst>
+          </p:cNvPr>
+          <p:cNvSpPr>
+            <a:spLocks noGrp="1"/>
+          </p:cNvSpPr>
+          <p:nvPr>
+            <p:ph type="ftr" sz="quarter" idx="11"/>
+          </p:nvPr>
+        </p:nvSpPr>
+        <p:spPr/>
+        <p:txBody>
+          <a:bodyPr/>
+          <a:lstStyle/>
+          <a:p>
+            <a:pPr algn="l">
+              <a:defRPr/>
+            </a:pPr>
+            <a:r>
+              <a:rPr lang="en-US"/>
+              <a:t>Copyright © 2021 Elephant Scale. All rights reserved.</a:t>
+            </a:r>
+            <a:endParaRPr lang="en-US" dirty="0"/>
+          </a:p>
+        </p:txBody>
+      </p:sp>
+      <p:sp>
+        <p:nvSpPr>
+          <p:cNvPr id="5" name="Slide Number Placeholder 4">
+            <a:extLst>
+              <a:ext uri="{FF2B5EF4-FFF2-40B4-BE49-F238E27FC236}">
+                <a16:creationId xmlns:a16="http://schemas.microsoft.com/office/drawing/2014/main" id="{742482B0-F980-4D5D-A4E3-9288BBF5DA91}"/>
+              </a:ext>
+            </a:extLst>
+          </p:cNvPr>
+          <p:cNvSpPr>
+            <a:spLocks noGrp="1"/>
+          </p:cNvSpPr>
+          <p:nvPr>
+            <p:ph type="sldNum" sz="quarter" idx="12"/>
+          </p:nvPr>
+        </p:nvSpPr>
+        <p:spPr/>
+        <p:txBody>
+          <a:bodyPr/>
+          <a:lstStyle/>
+          <a:p>
+            <a:pPr>
+              <a:defRPr/>
+            </a:pPr>
+            <a:fld id="{77EF9825-4C23-4085-A4E3-B5565466BD91}" type="slidenum">
+              <a:rPr lang="en-US" smtClean="0"/>
+              <a:t>18</a:t>
+            </a:fld>
+            <a:endParaRPr lang="en-US" dirty="0"/>
+          </a:p>
+        </p:txBody>
+      </p:sp>
+    </p:spTree>
+    <p:extLst>
+      <p:ext uri="{BB962C8B-B14F-4D97-AF65-F5344CB8AC3E}">
+        <p14:creationId xmlns:p14="http://schemas.microsoft.com/office/powerpoint/2010/main" val="2631874780"/>
+      </p:ext>
+    </p:extLst>
+  </p:cSld>
+  <p:clrMapOvr>
+    <a:masterClrMapping/>
+  </p:clrMapOvr>
+</p:sld>
+</file>
+
+<file path=ppt/slides/slide19.xml><?xml version="1.0" encoding="utf-8"?>
+<p:sld xmlns:a="http://schemas.openxmlformats.org/drawingml/2006/main" xmlns:r="http://schemas.openxmlformats.org/officeDocument/2006/relationships" xmlns:p="http://schemas.openxmlformats.org/presentationml/2006/main">
+  <p:cSld>
+    <p:spTree>
+      <p:nvGrpSpPr>
+        <p:cNvPr id="1" name=""/>
+        <p:cNvGrpSpPr/>
+        <p:nvPr/>
+      </p:nvGrpSpPr>
+      <p:grpSpPr>
+        <a:xfrm>
+          <a:off x="0" y="0"/>
+          <a:ext cx="0" cy="0"/>
+          <a:chOff x="0" y="0"/>
+          <a:chExt cx="0" cy="0"/>
+        </a:xfrm>
+      </p:grpSpPr>
+      <p:sp>
+        <p:nvSpPr>
+          <p:cNvPr id="2" name="Title 1">
+            <a:extLst>
+              <a:ext uri="{FF2B5EF4-FFF2-40B4-BE49-F238E27FC236}">
+                <a16:creationId xmlns:a16="http://schemas.microsoft.com/office/drawing/2014/main" id="{5677660D-5BF6-4280-A451-41C06C8D5757}"/>
+              </a:ext>
+            </a:extLst>
+          </p:cNvPr>
+          <p:cNvSpPr>
+            <a:spLocks noGrp="1"/>
+          </p:cNvSpPr>
+          <p:nvPr>
+            <p:ph type="title"/>
+          </p:nvPr>
+        </p:nvSpPr>
+        <p:spPr/>
+        <p:txBody>
+          <a:bodyPr/>
+          <a:lstStyle/>
+          <a:p>
+            <a:r>
+              <a:rPr lang="en-CA" dirty="0"/>
+              <a:t>Software Image and Update</a:t>
+            </a:r>
+          </a:p>
+        </p:txBody>
+      </p:sp>
+      <p:sp>
+        <p:nvSpPr>
+          <p:cNvPr id="3" name="Content Placeholder 2">
+            <a:extLst>
+              <a:ext uri="{FF2B5EF4-FFF2-40B4-BE49-F238E27FC236}">
+                <a16:creationId xmlns:a16="http://schemas.microsoft.com/office/drawing/2014/main" id="{17E7A7A0-ED20-407B-85C7-57091B48EB50}"/>
+              </a:ext>
+            </a:extLst>
+          </p:cNvPr>
+          <p:cNvSpPr>
+            <a:spLocks noGrp="1"/>
+          </p:cNvSpPr>
+          <p:nvPr>
+            <p:ph idx="1"/>
+          </p:nvPr>
+        </p:nvSpPr>
+        <p:spPr/>
+        <p:txBody>
+          <a:bodyPr/>
+          <a:lstStyle/>
+          <a:p>
+            <a:r>
+              <a:rPr lang="en-US" dirty="0"/>
+              <a:t>To establish the authenticity and integrity of a software update, a cryptographic signature is attached to the software package</a:t>
+            </a:r>
+          </a:p>
+          <a:p>
+            <a:pPr lvl="1"/>
+            <a:r>
+              <a:rPr lang="en-US" dirty="0"/>
+              <a:t>Devices only install updates if they first verify the signature</a:t>
+            </a:r>
+          </a:p>
+          <a:p>
+            <a:r>
+              <a:rPr lang="en-US" dirty="0"/>
+              <a:t>The signature’s cryptographic key size and hash algorithms have sufficient cryptographic strength for the intended service life of the product</a:t>
+            </a:r>
+          </a:p>
+          <a:p>
+            <a:r>
+              <a:rPr lang="en-US" dirty="0"/>
+              <a:t>The signature method chosen has a key provisioning method suitable for the intended manufacturing supply chain</a:t>
+            </a:r>
+          </a:p>
+          <a:p>
+            <a:r>
+              <a:rPr lang="en-US" dirty="0"/>
+              <a:t>The system makes use of any hardware cryptography support available on the device, such as hardware key store, accelerated hashing and decryption operations</a:t>
+            </a:r>
+          </a:p>
+          <a:p>
+            <a:r>
+              <a:rPr lang="en-US" dirty="0"/>
+              <a:t>The copies of the symmetric or asymmetric keys used to create the software component signatures are stored in sufficiently secure storage</a:t>
+            </a:r>
+            <a:endParaRPr lang="en-CA" dirty="0"/>
+          </a:p>
+        </p:txBody>
+      </p:sp>
+      <p:sp>
+        <p:nvSpPr>
+          <p:cNvPr id="4" name="Footer Placeholder 3">
+            <a:extLst>
+              <a:ext uri="{FF2B5EF4-FFF2-40B4-BE49-F238E27FC236}">
+                <a16:creationId xmlns:a16="http://schemas.microsoft.com/office/drawing/2014/main" id="{95D4DD04-9803-4637-80F9-4F918F405C6D}"/>
+              </a:ext>
+            </a:extLst>
+          </p:cNvPr>
+          <p:cNvSpPr>
+            <a:spLocks noGrp="1"/>
+          </p:cNvSpPr>
+          <p:nvPr>
+            <p:ph type="ftr" sz="quarter" idx="11"/>
+          </p:nvPr>
+        </p:nvSpPr>
+        <p:spPr/>
+        <p:txBody>
+          <a:bodyPr/>
+          <a:lstStyle/>
+          <a:p>
+            <a:pPr algn="l">
+              <a:defRPr/>
+            </a:pPr>
+            <a:r>
+              <a:rPr lang="en-US"/>
+              <a:t>Copyright © 2021 Elephant Scale. All rights reserved.</a:t>
+            </a:r>
+            <a:endParaRPr lang="en-US" dirty="0"/>
+          </a:p>
+        </p:txBody>
+      </p:sp>
+      <p:sp>
+        <p:nvSpPr>
+          <p:cNvPr id="5" name="Slide Number Placeholder 4">
+            <a:extLst>
+              <a:ext uri="{FF2B5EF4-FFF2-40B4-BE49-F238E27FC236}">
+                <a16:creationId xmlns:a16="http://schemas.microsoft.com/office/drawing/2014/main" id="{93116B63-664C-40FD-BB19-39F63D2DFDAA}"/>
+              </a:ext>
+            </a:extLst>
+          </p:cNvPr>
+          <p:cNvSpPr>
+            <a:spLocks noGrp="1"/>
+          </p:cNvSpPr>
+          <p:nvPr>
+            <p:ph type="sldNum" sz="quarter" idx="12"/>
+          </p:nvPr>
+        </p:nvSpPr>
+        <p:spPr/>
+        <p:txBody>
+          <a:bodyPr/>
+          <a:lstStyle/>
+          <a:p>
+            <a:pPr>
+              <a:defRPr/>
+            </a:pPr>
+            <a:fld id="{77EF9825-4C23-4085-A4E3-B5565466BD91}" type="slidenum">
+              <a:rPr lang="en-US" smtClean="0"/>
+              <a:t>19</a:t>
+            </a:fld>
+            <a:endParaRPr lang="en-US" dirty="0"/>
+          </a:p>
+        </p:txBody>
+      </p:sp>
+    </p:spTree>
+    <p:extLst>
+      <p:ext uri="{BB962C8B-B14F-4D97-AF65-F5344CB8AC3E}">
+        <p14:creationId xmlns:p14="http://schemas.microsoft.com/office/powerpoint/2010/main" val="3549299668"/>
       </p:ext>
     </p:extLst>
   </p:cSld>
@@ -3762,6 +4526,196 @@
     <p:extLst>
       <p:ext uri="{BB962C8B-B14F-4D97-AF65-F5344CB8AC3E}">
         <p14:creationId xmlns:p14="http://schemas.microsoft.com/office/powerpoint/2010/main" val="3228606204"/>
+      </p:ext>
+    </p:extLst>
+  </p:cSld>
+  <p:clrMapOvr>
+    <a:masterClrMapping/>
+  </p:clrMapOvr>
+</p:sld>
+</file>
+
+<file path=ppt/slides/slide20.xml><?xml version="1.0" encoding="utf-8"?>
+<p:sld xmlns:a="http://schemas.openxmlformats.org/drawingml/2006/main" xmlns:r="http://schemas.openxmlformats.org/officeDocument/2006/relationships" xmlns:p="http://schemas.openxmlformats.org/presentationml/2006/main">
+  <p:cSld>
+    <p:spTree>
+      <p:nvGrpSpPr>
+        <p:cNvPr id="1" name=""/>
+        <p:cNvGrpSpPr/>
+        <p:nvPr/>
+      </p:nvGrpSpPr>
+      <p:grpSpPr>
+        <a:xfrm>
+          <a:off x="0" y="0"/>
+          <a:ext cx="0" cy="0"/>
+          <a:chOff x="0" y="0"/>
+          <a:chExt cx="0" cy="0"/>
+        </a:xfrm>
+      </p:grpSpPr>
+      <p:sp>
+        <p:nvSpPr>
+          <p:cNvPr id="2" name="Title 1">
+            <a:extLst>
+              <a:ext uri="{FF2B5EF4-FFF2-40B4-BE49-F238E27FC236}">
+                <a16:creationId xmlns:a16="http://schemas.microsoft.com/office/drawing/2014/main" id="{27AEEBEE-7B45-482F-AA7D-E41FCF398A3F}"/>
+              </a:ext>
+            </a:extLst>
+          </p:cNvPr>
+          <p:cNvSpPr>
+            <a:spLocks noGrp="1"/>
+          </p:cNvSpPr>
+          <p:nvPr>
+            <p:ph type="title"/>
+          </p:nvPr>
+        </p:nvSpPr>
+        <p:spPr/>
+        <p:txBody>
+          <a:bodyPr/>
+          <a:lstStyle/>
+          <a:p>
+            <a:r>
+              <a:rPr lang="en-CA" dirty="0"/>
+              <a:t>Side Channel Attacks</a:t>
+            </a:r>
+          </a:p>
+        </p:txBody>
+      </p:sp>
+      <p:sp>
+        <p:nvSpPr>
+          <p:cNvPr id="3" name="Content Placeholder 2">
+            <a:extLst>
+              <a:ext uri="{FF2B5EF4-FFF2-40B4-BE49-F238E27FC236}">
+                <a16:creationId xmlns:a16="http://schemas.microsoft.com/office/drawing/2014/main" id="{6229E32C-9045-4F92-82E8-4870D7D9FC67}"/>
+              </a:ext>
+            </a:extLst>
+          </p:cNvPr>
+          <p:cNvSpPr>
+            <a:spLocks noGrp="1"/>
+          </p:cNvSpPr>
+          <p:nvPr>
+            <p:ph idx="1"/>
+          </p:nvPr>
+        </p:nvSpPr>
+        <p:spPr/>
+        <p:txBody>
+          <a:bodyPr/>
+          <a:lstStyle/>
+          <a:p>
+            <a:r>
+              <a:rPr lang="en-US" dirty="0"/>
+              <a:t>A Side Channel is an unintended/unanticipated capability to observe changes in the state of a component</a:t>
+            </a:r>
+          </a:p>
+          <a:p>
+            <a:pPr lvl="1"/>
+            <a:r>
+              <a:rPr lang="en-US" dirty="0"/>
+              <a:t>Could be at the chip, board, application, device or network level</a:t>
+            </a:r>
+          </a:p>
+          <a:p>
+            <a:pPr lvl="1"/>
+            <a:r>
+              <a:rPr lang="en-US" dirty="0"/>
+              <a:t>Deduce information based on these changes and then use that information to exploit the system</a:t>
+            </a:r>
+          </a:p>
+          <a:p>
+            <a:pPr lvl="1"/>
+            <a:r>
+              <a:rPr lang="en-US" dirty="0"/>
+              <a:t>Especially when dealing with high-risk scenarios or those in harsh environments</a:t>
+            </a:r>
+          </a:p>
+          <a:p>
+            <a:r>
+              <a:rPr lang="en-US" dirty="0"/>
+              <a:t> Fault Injections deliberately runs a system under conditions outside those for which it was designed	</a:t>
+            </a:r>
+          </a:p>
+          <a:p>
+            <a:pPr lvl="1"/>
+            <a:r>
+              <a:rPr lang="en-US" dirty="0"/>
+              <a:t>Can be used to establish side channels</a:t>
+            </a:r>
+          </a:p>
+          <a:p>
+            <a:pPr marL="0" indent="0">
+              <a:buNone/>
+            </a:pPr>
+            <a:endParaRPr lang="en-CA" dirty="0"/>
+          </a:p>
+        </p:txBody>
+      </p:sp>
+      <p:sp>
+        <p:nvSpPr>
+          <p:cNvPr id="4" name="Footer Placeholder 3">
+            <a:extLst>
+              <a:ext uri="{FF2B5EF4-FFF2-40B4-BE49-F238E27FC236}">
+                <a16:creationId xmlns:a16="http://schemas.microsoft.com/office/drawing/2014/main" id="{95CC9046-DF78-48B4-8FA6-0ACCBE10BB57}"/>
+              </a:ext>
+            </a:extLst>
+          </p:cNvPr>
+          <p:cNvSpPr>
+            <a:spLocks noGrp="1"/>
+          </p:cNvSpPr>
+          <p:nvPr>
+            <p:ph type="ftr" sz="quarter" idx="11"/>
+          </p:nvPr>
+        </p:nvSpPr>
+        <p:spPr/>
+        <p:txBody>
+          <a:bodyPr/>
+          <a:lstStyle/>
+          <a:p>
+            <a:pPr algn="l">
+              <a:defRPr/>
+            </a:pPr>
+            <a:r>
+              <a:rPr lang="en-US"/>
+              <a:t>Copyright © 2021 Elephant Scale. All rights reserved.</a:t>
+            </a:r>
+            <a:endParaRPr lang="en-US" dirty="0"/>
+          </a:p>
+        </p:txBody>
+      </p:sp>
+      <p:sp>
+        <p:nvSpPr>
+          <p:cNvPr id="5" name="Slide Number Placeholder 4">
+            <a:extLst>
+              <a:ext uri="{FF2B5EF4-FFF2-40B4-BE49-F238E27FC236}">
+                <a16:creationId xmlns:a16="http://schemas.microsoft.com/office/drawing/2014/main" id="{25014C42-FDD2-417F-9755-2F51904BC9EB}"/>
+              </a:ext>
+            </a:extLst>
+          </p:cNvPr>
+          <p:cNvSpPr>
+            <a:spLocks noGrp="1"/>
+          </p:cNvSpPr>
+          <p:nvPr>
+            <p:ph type="sldNum" sz="quarter" idx="12"/>
+          </p:nvPr>
+        </p:nvSpPr>
+        <p:spPr/>
+        <p:txBody>
+          <a:bodyPr/>
+          <a:lstStyle/>
+          <a:p>
+            <a:pPr>
+              <a:defRPr/>
+            </a:pPr>
+            <a:fld id="{77EF9825-4C23-4085-A4E3-B5565466BD91}" type="slidenum">
+              <a:rPr lang="en-US" smtClean="0"/>
+              <a:t>20</a:t>
+            </a:fld>
+            <a:endParaRPr lang="en-US" dirty="0"/>
+          </a:p>
+        </p:txBody>
+      </p:sp>
+    </p:spTree>
+    <p:extLst>
+      <p:ext uri="{BB962C8B-B14F-4D97-AF65-F5344CB8AC3E}">
+        <p14:creationId xmlns:p14="http://schemas.microsoft.com/office/powerpoint/2010/main" val="2668132109"/>
       </p:ext>
     </p:extLst>
   </p:cSld>
@@ -4911,6 +5865,12 @@
             <a:r>
               <a:rPr lang="en-US" dirty="0"/>
               <a:t>Ensure failures at any stage of the boot sequence fail gracefully into a secure state that prevents unauthorized access</a:t>
+            </a:r>
+          </a:p>
+          <a:p>
+            <a:r>
+              <a:rPr lang="en-US" dirty="0"/>
+              <a:t>This applies to the booting up a device, not software that runs of the device – that is covered later</a:t>
             </a:r>
             <a:endParaRPr lang="en-CA" dirty="0"/>
           </a:p>

</xml_diff>